<commit_message>
Update figures and notebook post on code bug
</commit_message>
<xml_diff>
--- a/figures/FullSet/FullSetSummary.pptx
+++ b/figures/FullSet/FullSetSummary.pptx
@@ -3323,12 +3323,55 @@
           <a:chExt cx="0" cy="0"/>
         </a:xfrm>
       </p:grpSpPr>
+      <p:sp>
+        <p:nvSpPr>
+          <p:cNvPr id="8" name="TextBox 7">
+            <a:extLst>
+              <a:ext uri="{FF2B5EF4-FFF2-40B4-BE49-F238E27FC236}">
+                <a16:creationId xmlns:a16="http://schemas.microsoft.com/office/drawing/2014/main" id="{17FBD0F9-18F2-8F4E-BE3A-71A18A7EA4C7}"/>
+              </a:ext>
+            </a:extLst>
+          </p:cNvPr>
+          <p:cNvSpPr txBox="1"/>
+          <p:nvPr/>
+        </p:nvSpPr>
+        <p:spPr>
+          <a:xfrm>
+            <a:off x="10218057" y="1814286"/>
+            <a:ext cx="1630506" cy="646331"/>
+          </a:xfrm>
+          <a:prstGeom prst="rect">
+            <a:avLst/>
+          </a:prstGeom>
+          <a:noFill/>
+        </p:spPr>
+        <p:txBody>
+          <a:bodyPr wrap="square" rtlCol="0">
+            <a:spAutoFit/>
+          </a:bodyPr>
+          <a:lstStyle/>
+          <a:p>
+            <a:pPr algn="ctr"/>
+            <a:r>
+              <a:rPr lang="en-US" dirty="0"/>
+              <a:t>Sigma K = 0.75</a:t>
+            </a:r>
+          </a:p>
+          <a:p>
+            <a:pPr algn="ctr"/>
+            <a:r>
+              <a:rPr lang="en-US" dirty="0"/>
+              <a:t>No Env Var</a:t>
+            </a:r>
+          </a:p>
+        </p:txBody>
+      </p:sp>
       <p:pic>
         <p:nvPicPr>
-          <p:cNvPr id="5" name="Picture 4">
-            <a:extLst>
-              <a:ext uri="{FF2B5EF4-FFF2-40B4-BE49-F238E27FC236}">
-                <a16:creationId xmlns:a16="http://schemas.microsoft.com/office/drawing/2014/main" id="{7D91A22F-1076-BD4B-A722-63724FE37CC1}"/>
+          <p:cNvPr id="12" name="Picture 11">
+            <a:extLst>
+              <a:ext uri="{FF2B5EF4-FFF2-40B4-BE49-F238E27FC236}">
+                <a16:creationId xmlns:a16="http://schemas.microsoft.com/office/drawing/2014/main" id="{B10D7B95-DF0F-BD4D-AE28-64EEEDC4F516}"/>
               </a:ext>
             </a:extLst>
           </p:cNvPr>
@@ -3346,7 +3389,7 @@
         <p:spPr>
           <a:xfrm>
             <a:off x="0" y="0"/>
-            <a:ext cx="5299365" cy="6858000"/>
+            <a:ext cx="5299364" cy="6858000"/>
           </a:xfrm>
           <a:prstGeom prst="rect">
             <a:avLst/>
@@ -3355,10 +3398,10 @@
       </p:pic>
       <p:pic>
         <p:nvPicPr>
-          <p:cNvPr id="7" name="Picture 6">
-            <a:extLst>
-              <a:ext uri="{FF2B5EF4-FFF2-40B4-BE49-F238E27FC236}">
-                <a16:creationId xmlns:a16="http://schemas.microsoft.com/office/drawing/2014/main" id="{D754EC97-DE87-1248-A277-A900D2AFBD7B}"/>
+          <p:cNvPr id="14" name="Picture 13">
+            <a:extLst>
+              <a:ext uri="{FF2B5EF4-FFF2-40B4-BE49-F238E27FC236}">
+                <a16:creationId xmlns:a16="http://schemas.microsoft.com/office/drawing/2014/main" id="{5F14D284-F585-D24C-BE08-0B186CAE56AC}"/>
               </a:ext>
             </a:extLst>
           </p:cNvPr>
@@ -3375,7 +3418,7 @@
         </p:blipFill>
         <p:spPr>
           <a:xfrm>
-            <a:off x="4242955" y="0"/>
+            <a:off x="4397504" y="0"/>
             <a:ext cx="5299364" cy="6858000"/>
           </a:xfrm>
           <a:prstGeom prst="rect">
@@ -3383,49 +3426,6 @@
           </a:prstGeom>
         </p:spPr>
       </p:pic>
-      <p:sp>
-        <p:nvSpPr>
-          <p:cNvPr id="8" name="TextBox 7">
-            <a:extLst>
-              <a:ext uri="{FF2B5EF4-FFF2-40B4-BE49-F238E27FC236}">
-                <a16:creationId xmlns:a16="http://schemas.microsoft.com/office/drawing/2014/main" id="{17FBD0F9-18F2-8F4E-BE3A-71A18A7EA4C7}"/>
-              </a:ext>
-            </a:extLst>
-          </p:cNvPr>
-          <p:cNvSpPr txBox="1"/>
-          <p:nvPr/>
-        </p:nvSpPr>
-        <p:spPr>
-          <a:xfrm>
-            <a:off x="10218057" y="1814286"/>
-            <a:ext cx="1630506" cy="646331"/>
-          </a:xfrm>
-          <a:prstGeom prst="rect">
-            <a:avLst/>
-          </a:prstGeom>
-          <a:noFill/>
-        </p:spPr>
-        <p:txBody>
-          <a:bodyPr wrap="square" rtlCol="0">
-            <a:spAutoFit/>
-          </a:bodyPr>
-          <a:lstStyle/>
-          <a:p>
-            <a:pPr algn="ctr"/>
-            <a:r>
-              <a:rPr lang="en-US" dirty="0"/>
-              <a:t>Sigma K = 0.75</a:t>
-            </a:r>
-          </a:p>
-          <a:p>
-            <a:pPr algn="ctr"/>
-            <a:r>
-              <a:rPr lang="en-US" dirty="0"/>
-              <a:t>No Env Var</a:t>
-            </a:r>
-          </a:p>
-        </p:txBody>
-      </p:sp>
     </p:spTree>
     <p:extLst>
       <p:ext uri="{BB962C8B-B14F-4D97-AF65-F5344CB8AC3E}">
@@ -3456,12 +3456,55 @@
           <a:chExt cx="0" cy="0"/>
         </a:xfrm>
       </p:grpSpPr>
+      <p:sp>
+        <p:nvSpPr>
+          <p:cNvPr id="8" name="TextBox 7">
+            <a:extLst>
+              <a:ext uri="{FF2B5EF4-FFF2-40B4-BE49-F238E27FC236}">
+                <a16:creationId xmlns:a16="http://schemas.microsoft.com/office/drawing/2014/main" id="{CA0982BE-E91E-5148-8E56-16FE89DF6336}"/>
+              </a:ext>
+            </a:extLst>
+          </p:cNvPr>
+          <p:cNvSpPr txBox="1"/>
+          <p:nvPr/>
+        </p:nvSpPr>
+        <p:spPr>
+          <a:xfrm>
+            <a:off x="10218057" y="1814286"/>
+            <a:ext cx="1451429" cy="646331"/>
+          </a:xfrm>
+          <a:prstGeom prst="rect">
+            <a:avLst/>
+          </a:prstGeom>
+          <a:noFill/>
+        </p:spPr>
+        <p:txBody>
+          <a:bodyPr wrap="square" rtlCol="0">
+            <a:spAutoFit/>
+          </a:bodyPr>
+          <a:lstStyle/>
+          <a:p>
+            <a:pPr algn="ctr"/>
+            <a:r>
+              <a:rPr lang="en-US" dirty="0"/>
+              <a:t>Sigma K = 1.5</a:t>
+            </a:r>
+          </a:p>
+          <a:p>
+            <a:pPr algn="ctr"/>
+            <a:r>
+              <a:rPr lang="en-US" dirty="0"/>
+              <a:t>No Env Var</a:t>
+            </a:r>
+          </a:p>
+        </p:txBody>
+      </p:sp>
       <p:pic>
         <p:nvPicPr>
-          <p:cNvPr id="5" name="Picture 4">
-            <a:extLst>
-              <a:ext uri="{FF2B5EF4-FFF2-40B4-BE49-F238E27FC236}">
-                <a16:creationId xmlns:a16="http://schemas.microsoft.com/office/drawing/2014/main" id="{9B76156D-AA94-4941-B925-2AEC46FE37C5}"/>
+          <p:cNvPr id="10" name="Picture 9">
+            <a:extLst>
+              <a:ext uri="{FF2B5EF4-FFF2-40B4-BE49-F238E27FC236}">
+                <a16:creationId xmlns:a16="http://schemas.microsoft.com/office/drawing/2014/main" id="{D432D717-3AF6-1141-AF82-5DAEAFD04C34}"/>
               </a:ext>
             </a:extLst>
           </p:cNvPr>
@@ -3488,10 +3531,10 @@
       </p:pic>
       <p:pic>
         <p:nvPicPr>
-          <p:cNvPr id="7" name="Picture 6">
-            <a:extLst>
-              <a:ext uri="{FF2B5EF4-FFF2-40B4-BE49-F238E27FC236}">
-                <a16:creationId xmlns:a16="http://schemas.microsoft.com/office/drawing/2014/main" id="{CA6D6507-4BE2-D44A-AEE8-3B21B99382D9}"/>
+          <p:cNvPr id="12" name="Picture 11">
+            <a:extLst>
+              <a:ext uri="{FF2B5EF4-FFF2-40B4-BE49-F238E27FC236}">
+                <a16:creationId xmlns:a16="http://schemas.microsoft.com/office/drawing/2014/main" id="{9017E11F-3A02-6B42-AC10-2E5354FE3249}"/>
               </a:ext>
             </a:extLst>
           </p:cNvPr>
@@ -3508,7 +3551,7 @@
         </p:blipFill>
         <p:spPr>
           <a:xfrm>
-            <a:off x="4388099" y="0"/>
+            <a:off x="4346204" y="0"/>
             <a:ext cx="5299364" cy="6858000"/>
           </a:xfrm>
           <a:prstGeom prst="rect">
@@ -3516,49 +3559,6 @@
           </a:prstGeom>
         </p:spPr>
       </p:pic>
-      <p:sp>
-        <p:nvSpPr>
-          <p:cNvPr id="8" name="TextBox 7">
-            <a:extLst>
-              <a:ext uri="{FF2B5EF4-FFF2-40B4-BE49-F238E27FC236}">
-                <a16:creationId xmlns:a16="http://schemas.microsoft.com/office/drawing/2014/main" id="{CA0982BE-E91E-5148-8E56-16FE89DF6336}"/>
-              </a:ext>
-            </a:extLst>
-          </p:cNvPr>
-          <p:cNvSpPr txBox="1"/>
-          <p:nvPr/>
-        </p:nvSpPr>
-        <p:spPr>
-          <a:xfrm>
-            <a:off x="10218057" y="1814286"/>
-            <a:ext cx="1451429" cy="646331"/>
-          </a:xfrm>
-          <a:prstGeom prst="rect">
-            <a:avLst/>
-          </a:prstGeom>
-          <a:noFill/>
-        </p:spPr>
-        <p:txBody>
-          <a:bodyPr wrap="square" rtlCol="0">
-            <a:spAutoFit/>
-          </a:bodyPr>
-          <a:lstStyle/>
-          <a:p>
-            <a:pPr algn="ctr"/>
-            <a:r>
-              <a:rPr lang="en-US" dirty="0"/>
-              <a:t>Sigma K = 1.5</a:t>
-            </a:r>
-          </a:p>
-          <a:p>
-            <a:pPr algn="ctr"/>
-            <a:r>
-              <a:rPr lang="en-US" dirty="0"/>
-              <a:t>No Env Var</a:t>
-            </a:r>
-          </a:p>
-        </p:txBody>
-      </p:sp>
     </p:spTree>
     <p:extLst>
       <p:ext uri="{BB962C8B-B14F-4D97-AF65-F5344CB8AC3E}">
@@ -3591,10 +3591,10 @@
       </p:grpSpPr>
       <p:pic>
         <p:nvPicPr>
-          <p:cNvPr id="7" name="Picture 6">
-            <a:extLst>
-              <a:ext uri="{FF2B5EF4-FFF2-40B4-BE49-F238E27FC236}">
-                <a16:creationId xmlns:a16="http://schemas.microsoft.com/office/drawing/2014/main" id="{CF3DF570-A4D1-C54D-ACD2-41197B462D98}"/>
+          <p:cNvPr id="12" name="Picture 11">
+            <a:extLst>
+              <a:ext uri="{FF2B5EF4-FFF2-40B4-BE49-F238E27FC236}">
+                <a16:creationId xmlns:a16="http://schemas.microsoft.com/office/drawing/2014/main" id="{25CDF4AB-ED2F-BC4F-92E3-215768688467}"/>
               </a:ext>
             </a:extLst>
           </p:cNvPr>
@@ -3619,12 +3619,55 @@
           </a:prstGeom>
         </p:spPr>
       </p:pic>
+      <p:sp>
+        <p:nvSpPr>
+          <p:cNvPr id="8" name="TextBox 7">
+            <a:extLst>
+              <a:ext uri="{FF2B5EF4-FFF2-40B4-BE49-F238E27FC236}">
+                <a16:creationId xmlns:a16="http://schemas.microsoft.com/office/drawing/2014/main" id="{EF1D13F1-9B3E-F041-837B-AFCA4E52CFA4}"/>
+              </a:ext>
+            </a:extLst>
+          </p:cNvPr>
+          <p:cNvSpPr txBox="1"/>
+          <p:nvPr/>
+        </p:nvSpPr>
+        <p:spPr>
+          <a:xfrm>
+            <a:off x="10218057" y="1814286"/>
+            <a:ext cx="1451429" cy="646331"/>
+          </a:xfrm>
+          <a:prstGeom prst="rect">
+            <a:avLst/>
+          </a:prstGeom>
+          <a:noFill/>
+        </p:spPr>
+        <p:txBody>
+          <a:bodyPr wrap="square" rtlCol="0">
+            <a:spAutoFit/>
+          </a:bodyPr>
+          <a:lstStyle/>
+          <a:p>
+            <a:pPr algn="ctr"/>
+            <a:r>
+              <a:rPr lang="en-US" dirty="0"/>
+              <a:t>Sigma K = 3</a:t>
+            </a:r>
+          </a:p>
+          <a:p>
+            <a:pPr algn="ctr"/>
+            <a:r>
+              <a:rPr lang="en-US" dirty="0"/>
+              <a:t>No Env Var</a:t>
+            </a:r>
+          </a:p>
+        </p:txBody>
+      </p:sp>
       <p:pic>
         <p:nvPicPr>
-          <p:cNvPr id="5" name="Picture 4">
-            <a:extLst>
-              <a:ext uri="{FF2B5EF4-FFF2-40B4-BE49-F238E27FC236}">
-                <a16:creationId xmlns:a16="http://schemas.microsoft.com/office/drawing/2014/main" id="{2AF75711-C1C6-0449-8CCF-8A4C13B8F245}"/>
+          <p:cNvPr id="10" name="Picture 9">
+            <a:extLst>
+              <a:ext uri="{FF2B5EF4-FFF2-40B4-BE49-F238E27FC236}">
+                <a16:creationId xmlns:a16="http://schemas.microsoft.com/office/drawing/2014/main" id="{560E7325-2B7F-F547-9738-53E741167C1F}"/>
               </a:ext>
             </a:extLst>
           </p:cNvPr>
@@ -3641,7 +3684,7 @@
         </p:blipFill>
         <p:spPr>
           <a:xfrm>
-            <a:off x="4395989" y="0"/>
+            <a:off x="4347949" y="3629"/>
             <a:ext cx="5299364" cy="6858000"/>
           </a:xfrm>
           <a:prstGeom prst="rect">
@@ -3649,49 +3692,6 @@
           </a:prstGeom>
         </p:spPr>
       </p:pic>
-      <p:sp>
-        <p:nvSpPr>
-          <p:cNvPr id="8" name="TextBox 7">
-            <a:extLst>
-              <a:ext uri="{FF2B5EF4-FFF2-40B4-BE49-F238E27FC236}">
-                <a16:creationId xmlns:a16="http://schemas.microsoft.com/office/drawing/2014/main" id="{EF1D13F1-9B3E-F041-837B-AFCA4E52CFA4}"/>
-              </a:ext>
-            </a:extLst>
-          </p:cNvPr>
-          <p:cNvSpPr txBox="1"/>
-          <p:nvPr/>
-        </p:nvSpPr>
-        <p:spPr>
-          <a:xfrm>
-            <a:off x="10218057" y="1814286"/>
-            <a:ext cx="1451429" cy="646331"/>
-          </a:xfrm>
-          <a:prstGeom prst="rect">
-            <a:avLst/>
-          </a:prstGeom>
-          <a:noFill/>
-        </p:spPr>
-        <p:txBody>
-          <a:bodyPr wrap="square" rtlCol="0">
-            <a:spAutoFit/>
-          </a:bodyPr>
-          <a:lstStyle/>
-          <a:p>
-            <a:pPr algn="ctr"/>
-            <a:r>
-              <a:rPr lang="en-US" dirty="0"/>
-              <a:t>Sigma K = 3</a:t>
-            </a:r>
-          </a:p>
-          <a:p>
-            <a:pPr algn="ctr"/>
-            <a:r>
-              <a:rPr lang="en-US" dirty="0"/>
-              <a:t>No Env Var</a:t>
-            </a:r>
-          </a:p>
-        </p:txBody>
-      </p:sp>
     </p:spTree>
     <p:extLst>
       <p:ext uri="{BB962C8B-B14F-4D97-AF65-F5344CB8AC3E}">

</xml_diff>